<commit_message>
Removal of Retrieval Attempt for Screenshots
Removed DB retrieval attempt PHP code from index.php, and moved it to
retrievedDB.php, while taking screenshots for presentation.
</commit_message>
<xml_diff>
--- a/Security.pptx
+++ b/Security.pptx
@@ -5952,7 +5952,7 @@
           <a:p>
             <a:pPr algn="ctr"/>
             <a:r>
-              <a:rPr lang="en-US" dirty="0" smtClean="0"/>
+              <a:rPr lang="en-US" u="sng" dirty="0" smtClean="0"/>
               <a:t>UI &amp; UX</a:t>
             </a:r>
           </a:p>
@@ -5984,11 +5984,11 @@
           <a:p>
             <a:pPr algn="ctr"/>
             <a:r>
-              <a:rPr lang="en-US" dirty="0"/>
+              <a:rPr lang="en-US" u="sng" dirty="0"/>
               <a:t>Accessibility </a:t>
             </a:r>
             <a:r>
-              <a:rPr lang="en-US" dirty="0" smtClean="0"/>
+              <a:rPr lang="en-US" u="sng" dirty="0" smtClean="0"/>
               <a:t>&amp; Responsiveness</a:t>
             </a:r>
           </a:p>

</xml_diff>